<commit_message>
edit powe point prezentation
</commit_message>
<xml_diff>
--- a/Prez/NULL/Nothing.pptx
+++ b/Prez/NULL/Nothing.pptx
@@ -3082,7 +3082,7 @@
                 <a:latin typeface="Consolas" panose="020B0609020204030204" pitchFamily="49" charset="0"/>
                 <a:cs typeface="Consolas" panose="020B0609020204030204" pitchFamily="49" charset="0"/>
               </a:rPr>
-              <a:t>print</a:t>
+              <a:t>printf</a:t>
             </a:r>
             <a:r>
               <a:rPr lang="pl-PL" sz="4400" dirty="0">
@@ -12345,6 +12345,58 @@
       </p:grpSpPr>
       <p:sp>
         <p:nvSpPr>
+          <p:cNvPr id="3" name="Prostokąt 2">
+            <a:extLst>
+              <a:ext uri="{FF2B5EF4-FFF2-40B4-BE49-F238E27FC236}">
+                <a16:creationId xmlns:a16="http://schemas.microsoft.com/office/drawing/2014/main" id="{889D5B25-9098-4337-95E6-2EDF7BA9DE75}"/>
+              </a:ext>
+            </a:extLst>
+          </p:cNvPr>
+          <p:cNvSpPr/>
+          <p:nvPr/>
+        </p:nvSpPr>
+        <p:spPr>
+          <a:xfrm>
+            <a:off x="2583402" y="3506680"/>
+            <a:ext cx="6001305" cy="559293"/>
+          </a:xfrm>
+          <a:prstGeom prst="rect">
+            <a:avLst/>
+          </a:prstGeom>
+          <a:solidFill>
+            <a:srgbClr val="FFFF00"/>
+          </a:solidFill>
+          <a:ln>
+            <a:noFill/>
+          </a:ln>
+        </p:spPr>
+        <p:style>
+          <a:lnRef idx="2">
+            <a:schemeClr val="accent1">
+              <a:shade val="50000"/>
+            </a:schemeClr>
+          </a:lnRef>
+          <a:fillRef idx="1">
+            <a:schemeClr val="accent1"/>
+          </a:fillRef>
+          <a:effectRef idx="0">
+            <a:schemeClr val="accent1"/>
+          </a:effectRef>
+          <a:fontRef idx="minor">
+            <a:schemeClr val="lt1"/>
+          </a:fontRef>
+        </p:style>
+        <p:txBody>
+          <a:bodyPr rtlCol="0" anchor="ctr"/>
+          <a:lstStyle/>
+          <a:p>
+            <a:pPr algn="ctr"/>
+            <a:endParaRPr lang="pl-PL"/>
+          </a:p>
+        </p:txBody>
+      </p:sp>
+      <p:sp>
+        <p:nvSpPr>
           <p:cNvPr id="2" name="pole tekstowe 1">
             <a:extLst>
               <a:ext uri="{FF2B5EF4-FFF2-40B4-BE49-F238E27FC236}">
@@ -13267,20 +13319,40 @@
               <a:t> = () =&gt; </a:t>
             </a:r>
             <a:r>
-              <a:rPr lang="pl-PL" sz="4000" dirty="0" err="1"/>
+              <a:rPr lang="pl-PL" sz="4000" dirty="0" err="1">
+                <a:solidFill>
+                  <a:srgbClr val="0070C0"/>
+                </a:solidFill>
+              </a:rPr>
               <a:t>throw</a:t>
             </a:r>
             <a:r>
+              <a:rPr lang="pl-PL" sz="4000" dirty="0">
+                <a:solidFill>
+                  <a:srgbClr val="0070C0"/>
+                </a:solidFill>
+              </a:rPr>
+              <a:t> </a:t>
+            </a:r>
+            <a:r>
+              <a:rPr lang="pl-PL" sz="4000" dirty="0" err="1">
+                <a:solidFill>
+                  <a:srgbClr val="0070C0"/>
+                </a:solidFill>
+              </a:rPr>
+              <a:t>new</a:t>
+            </a:r>
+            <a:r>
+              <a:rPr lang="pl-PL" sz="4000" dirty="0">
+                <a:solidFill>
+                  <a:srgbClr val="0070C0"/>
+                </a:solidFill>
+              </a:rPr>
+              <a:t> </a:t>
+            </a:r>
+            <a:r>
               <a:rPr lang="pl-PL" sz="4000" dirty="0"/>
-              <a:t> </a:t>
-            </a:r>
-            <a:r>
-              <a:rPr lang="pl-PL" sz="4000" dirty="0" err="1"/>
-              <a:t>new</a:t>
-            </a:r>
-            <a:r>
-              <a:rPr lang="pl-PL" sz="4000" dirty="0"/>
-              <a:t> 		</a:t>
+              <a:t>		</a:t>
             </a:r>
             <a:r>
               <a:rPr lang="pl-PL" sz="4000" dirty="0" err="1"/>

</xml_diff>